<commit_message>
Update/add document for new geometry
</commit_message>
<xml_diff>
--- a/docs/EMCCDregisters.pptx
+++ b/docs/EMCCDregisters.pptx
@@ -156,10 +156,9 @@
           </a:lstStyle>
           <a:p>
             <a:r>
-              <a:rPr lang="en-US" smtClean="0"/>
+              <a:rPr lang="en-US"/>
               <a:t>Click to edit Master title style</a:t>
             </a:r>
-            <a:endParaRPr lang="en-US"/>
           </a:p>
         </p:txBody>
       </p:sp>
@@ -223,10 +222,9 @@
           </a:lstStyle>
           <a:p>
             <a:r>
-              <a:rPr lang="en-US" smtClean="0"/>
+              <a:rPr lang="en-US"/>
               <a:t>Click to edit Master subtitle style</a:t>
             </a:r>
-            <a:endParaRPr lang="en-US"/>
           </a:p>
         </p:txBody>
       </p:sp>
@@ -247,7 +245,7 @@
           <a:p>
             <a:fld id="{8A8ABAD3-8CA3-4638-B585-675408D1771D}" type="datetime1">
               <a:rPr lang="en-US" smtClean="0"/>
-              <a:t>3/10/2020</a:t>
+              <a:t>12/7/21</a:t>
             </a:fld>
             <a:endParaRPr lang="en-US"/>
           </a:p>
@@ -341,10 +339,9 @@
           <a:lstStyle/>
           <a:p>
             <a:r>
-              <a:rPr lang="en-US" smtClean="0"/>
+              <a:rPr lang="en-US"/>
               <a:t>Click to edit Master title style</a:t>
             </a:r>
-            <a:endParaRPr lang="en-US"/>
           </a:p>
         </p:txBody>
       </p:sp>
@@ -365,35 +362,35 @@
           <a:p>
             <a:pPr lvl="0"/>
             <a:r>
-              <a:rPr lang="en-US" smtClean="0"/>
+              <a:rPr lang="en-US"/>
               <a:t>Edit Master text styles</a:t>
             </a:r>
           </a:p>
           <a:p>
             <a:pPr lvl="1"/>
             <a:r>
-              <a:rPr lang="en-US" smtClean="0"/>
+              <a:rPr lang="en-US"/>
               <a:t>Second level</a:t>
             </a:r>
           </a:p>
           <a:p>
             <a:pPr lvl="2"/>
             <a:r>
-              <a:rPr lang="en-US" smtClean="0"/>
+              <a:rPr lang="en-US"/>
               <a:t>Third level</a:t>
             </a:r>
           </a:p>
           <a:p>
             <a:pPr lvl="3"/>
             <a:r>
-              <a:rPr lang="en-US" smtClean="0"/>
+              <a:rPr lang="en-US"/>
               <a:t>Fourth level</a:t>
             </a:r>
           </a:p>
           <a:p>
             <a:pPr lvl="4"/>
             <a:r>
-              <a:rPr lang="en-US" smtClean="0"/>
+              <a:rPr lang="en-US"/>
               <a:t>Fifth level</a:t>
             </a:r>
             <a:endParaRPr lang="en-US" dirty="0"/>
@@ -417,7 +414,7 @@
           <a:p>
             <a:fld id="{EC65AD7E-9660-4520-8EDF-6225BDB2DB6E}" type="datetime1">
               <a:rPr lang="en-US" smtClean="0"/>
-              <a:t>3/10/2020</a:t>
+              <a:t>12/7/21</a:t>
             </a:fld>
             <a:endParaRPr lang="en-US"/>
           </a:p>
@@ -511,10 +508,9 @@
           <a:lstStyle/>
           <a:p>
             <a:r>
-              <a:rPr lang="en-US" smtClean="0"/>
+              <a:rPr lang="en-US"/>
               <a:t>Click to edit Master title style</a:t>
             </a:r>
-            <a:endParaRPr lang="en-US"/>
           </a:p>
         </p:txBody>
       </p:sp>
@@ -540,38 +536,37 @@
           <a:p>
             <a:pPr lvl="0"/>
             <a:r>
-              <a:rPr lang="en-US" smtClean="0"/>
+              <a:rPr lang="en-US"/>
               <a:t>Edit Master text styles</a:t>
             </a:r>
           </a:p>
           <a:p>
             <a:pPr lvl="1"/>
             <a:r>
-              <a:rPr lang="en-US" smtClean="0"/>
+              <a:rPr lang="en-US"/>
               <a:t>Second level</a:t>
             </a:r>
           </a:p>
           <a:p>
             <a:pPr lvl="2"/>
             <a:r>
-              <a:rPr lang="en-US" smtClean="0"/>
+              <a:rPr lang="en-US"/>
               <a:t>Third level</a:t>
             </a:r>
           </a:p>
           <a:p>
             <a:pPr lvl="3"/>
             <a:r>
-              <a:rPr lang="en-US" smtClean="0"/>
+              <a:rPr lang="en-US"/>
               <a:t>Fourth level</a:t>
             </a:r>
           </a:p>
           <a:p>
             <a:pPr lvl="4"/>
             <a:r>
-              <a:rPr lang="en-US" smtClean="0"/>
+              <a:rPr lang="en-US"/>
               <a:t>Fifth level</a:t>
             </a:r>
-            <a:endParaRPr lang="en-US"/>
           </a:p>
         </p:txBody>
       </p:sp>
@@ -592,7 +587,7 @@
           <a:p>
             <a:fld id="{04B08570-9C16-4A7D-99A3-310BF8625FF8}" type="datetime1">
               <a:rPr lang="en-US" smtClean="0"/>
-              <a:t>3/10/2020</a:t>
+              <a:t>12/7/21</a:t>
             </a:fld>
             <a:endParaRPr lang="en-US"/>
           </a:p>
@@ -686,10 +681,9 @@
           <a:lstStyle/>
           <a:p>
             <a:r>
-              <a:rPr lang="en-US" smtClean="0"/>
+              <a:rPr lang="en-US"/>
               <a:t>Click to edit Master title style</a:t>
             </a:r>
-            <a:endParaRPr lang="en-US"/>
           </a:p>
         </p:txBody>
       </p:sp>
@@ -715,38 +709,37 @@
           <a:p>
             <a:pPr lvl="0"/>
             <a:r>
-              <a:rPr lang="en-US" smtClean="0"/>
+              <a:rPr lang="en-US"/>
               <a:t>Edit Master text styles</a:t>
             </a:r>
           </a:p>
           <a:p>
             <a:pPr lvl="1"/>
             <a:r>
-              <a:rPr lang="en-US" smtClean="0"/>
+              <a:rPr lang="en-US"/>
               <a:t>Second level</a:t>
             </a:r>
           </a:p>
           <a:p>
             <a:pPr lvl="2"/>
             <a:r>
-              <a:rPr lang="en-US" smtClean="0"/>
+              <a:rPr lang="en-US"/>
               <a:t>Third level</a:t>
             </a:r>
           </a:p>
           <a:p>
             <a:pPr lvl="3"/>
             <a:r>
-              <a:rPr lang="en-US" smtClean="0"/>
+              <a:rPr lang="en-US"/>
               <a:t>Fourth level</a:t>
             </a:r>
           </a:p>
           <a:p>
             <a:pPr lvl="4"/>
             <a:r>
-              <a:rPr lang="en-US" smtClean="0"/>
+              <a:rPr lang="en-US"/>
               <a:t>Fifth level</a:t>
             </a:r>
-            <a:endParaRPr lang="en-US"/>
           </a:p>
         </p:txBody>
       </p:sp>
@@ -767,7 +760,7 @@
           <a:p>
             <a:fld id="{CA4FBBCB-C646-47E8-ADE7-8A831C49BCBC}" type="datetime1">
               <a:rPr lang="en-US" smtClean="0"/>
-              <a:t>3/10/2020</a:t>
+              <a:t>12/7/21</a:t>
             </a:fld>
             <a:endParaRPr lang="en-US"/>
           </a:p>
@@ -861,10 +854,9 @@
           <a:lstStyle/>
           <a:p>
             <a:r>
-              <a:rPr lang="en-US" smtClean="0"/>
+              <a:rPr lang="en-US"/>
               <a:t>Click to edit Master title style</a:t>
             </a:r>
-            <a:endParaRPr lang="en-US"/>
           </a:p>
         </p:txBody>
       </p:sp>
@@ -890,38 +882,37 @@
           <a:p>
             <a:pPr lvl="0"/>
             <a:r>
-              <a:rPr lang="en-US" smtClean="0"/>
+              <a:rPr lang="en-US"/>
               <a:t>Edit Master text styles</a:t>
             </a:r>
           </a:p>
           <a:p>
             <a:pPr lvl="1"/>
             <a:r>
-              <a:rPr lang="en-US" smtClean="0"/>
+              <a:rPr lang="en-US"/>
               <a:t>Second level</a:t>
             </a:r>
           </a:p>
           <a:p>
             <a:pPr lvl="2"/>
             <a:r>
-              <a:rPr lang="en-US" smtClean="0"/>
+              <a:rPr lang="en-US"/>
               <a:t>Third level</a:t>
             </a:r>
           </a:p>
           <a:p>
             <a:pPr lvl="3"/>
             <a:r>
-              <a:rPr lang="en-US" smtClean="0"/>
+              <a:rPr lang="en-US"/>
               <a:t>Fourth level</a:t>
             </a:r>
           </a:p>
           <a:p>
             <a:pPr lvl="4"/>
             <a:r>
-              <a:rPr lang="en-US" smtClean="0"/>
+              <a:rPr lang="en-US"/>
               <a:t>Fifth level</a:t>
             </a:r>
-            <a:endParaRPr lang="en-US"/>
           </a:p>
         </p:txBody>
       </p:sp>
@@ -947,38 +938,37 @@
           <a:p>
             <a:pPr lvl="0"/>
             <a:r>
-              <a:rPr lang="en-US" smtClean="0"/>
+              <a:rPr lang="en-US"/>
               <a:t>Edit Master text styles</a:t>
             </a:r>
           </a:p>
           <a:p>
             <a:pPr lvl="1"/>
             <a:r>
-              <a:rPr lang="en-US" smtClean="0"/>
+              <a:rPr lang="en-US"/>
               <a:t>Second level</a:t>
             </a:r>
           </a:p>
           <a:p>
             <a:pPr lvl="2"/>
             <a:r>
-              <a:rPr lang="en-US" smtClean="0"/>
+              <a:rPr lang="en-US"/>
               <a:t>Third level</a:t>
             </a:r>
           </a:p>
           <a:p>
             <a:pPr lvl="3"/>
             <a:r>
-              <a:rPr lang="en-US" smtClean="0"/>
+              <a:rPr lang="en-US"/>
               <a:t>Fourth level</a:t>
             </a:r>
           </a:p>
           <a:p>
             <a:pPr lvl="4"/>
             <a:r>
-              <a:rPr lang="en-US" smtClean="0"/>
+              <a:rPr lang="en-US"/>
               <a:t>Fifth level</a:t>
             </a:r>
-            <a:endParaRPr lang="en-US"/>
           </a:p>
         </p:txBody>
       </p:sp>
@@ -999,7 +989,7 @@
           <a:p>
             <a:fld id="{F19B148B-AB0F-45E9-95AF-37FB8E772EE4}" type="datetime1">
               <a:rPr lang="en-US" smtClean="0"/>
-              <a:t>3/10/2020</a:t>
+              <a:t>12/7/21</a:t>
             </a:fld>
             <a:endParaRPr lang="en-US"/>
           </a:p>
@@ -1093,10 +1083,9 @@
           <a:lstStyle/>
           <a:p>
             <a:r>
-              <a:rPr lang="en-US" smtClean="0"/>
+              <a:rPr lang="en-US"/>
               <a:t>Click to edit Master title style</a:t>
             </a:r>
-            <a:endParaRPr lang="en-US"/>
           </a:p>
         </p:txBody>
       </p:sp>
@@ -1117,7 +1106,7 @@
           <a:p>
             <a:fld id="{1235A78C-0150-495D-B98F-5B28557C0323}" type="datetime1">
               <a:rPr lang="en-US" smtClean="0"/>
-              <a:t>3/10/2020</a:t>
+              <a:t>12/7/21</a:t>
             </a:fld>
             <a:endParaRPr lang="en-US"/>
           </a:p>
@@ -1212,7 +1201,7 @@
           <a:p>
             <a:fld id="{A39A8311-4378-4169-866D-E73D191A5839}" type="datetime1">
               <a:rPr lang="en-US" smtClean="0"/>
-              <a:t>3/10/2020</a:t>
+              <a:t>12/7/21</a:t>
             </a:fld>
             <a:endParaRPr lang="en-US"/>
           </a:p>
@@ -1315,10 +1304,9 @@
           </a:lstStyle>
           <a:p>
             <a:r>
-              <a:rPr lang="en-US" smtClean="0"/>
+              <a:rPr lang="en-US"/>
               <a:t>Click to edit Master title style</a:t>
             </a:r>
-            <a:endParaRPr lang="en-US"/>
           </a:p>
         </p:txBody>
       </p:sp>
@@ -1435,7 +1423,7 @@
           <a:p>
             <a:pPr lvl="0"/>
             <a:r>
-              <a:rPr lang="en-US" smtClean="0"/>
+              <a:rPr lang="en-US"/>
               <a:t>Edit Master text styles</a:t>
             </a:r>
           </a:p>
@@ -1458,7 +1446,7 @@
           <a:p>
             <a:fld id="{7EB07490-3C73-4D19-9EA8-C480A9E8CC44}" type="datetime1">
               <a:rPr lang="en-US" smtClean="0"/>
-              <a:t>3/10/2020</a:t>
+              <a:t>12/7/21</a:t>
             </a:fld>
             <a:endParaRPr lang="en-US"/>
           </a:p>
@@ -1595,7 +1583,7 @@
           </a:lstStyle>
           <a:p>
             <a:r>
-              <a:rPr lang="en-US" smtClean="0"/>
+              <a:rPr lang="en-US"/>
               <a:t>Click to edit Master title style</a:t>
             </a:r>
             <a:endParaRPr lang="en-US" dirty="0"/>
@@ -1883,10 +1871,9 @@
           <a:lstStyle/>
           <a:p>
             <a:r>
-              <a:rPr lang="en-US" smtClean="0"/>
+              <a:rPr lang="en-US"/>
               <a:t>Click to edit Master title style</a:t>
             </a:r>
-            <a:endParaRPr lang="en-US"/>
           </a:p>
         </p:txBody>
       </p:sp>
@@ -1986,7 +1973,7 @@
           <a:p>
             <a:fld id="{C763806B-EDE1-4FBF-B2DD-1C2A57F79A4F}" type="datetime1">
               <a:rPr lang="en-US" smtClean="0"/>
-              <a:t>3/10/2020</a:t>
+              <a:t>12/7/21</a:t>
             </a:fld>
             <a:endParaRPr lang="en-US"/>
           </a:p>
@@ -2406,14 +2393,13 @@
           <a:lstStyle/>
           <a:p>
             <a:r>
-              <a:rPr lang="en-US" dirty="0" smtClean="0"/>
+              <a:rPr lang="en-US" dirty="0"/>
               <a:t>Naming convention for </a:t>
             </a:r>
             <a:r>
-              <a:rPr lang="en-US" smtClean="0"/>
+              <a:rPr lang="en-US"/>
               <a:t>the registers</a:t>
             </a:r>
-            <a:endParaRPr lang="en-US"/>
           </a:p>
         </p:txBody>
       </p:sp>
@@ -2491,7 +2477,7 @@
           <a:p>
             <a:pPr algn="ctr"/>
             <a:r>
-              <a:rPr lang="en-US" dirty="0" smtClean="0">
+              <a:rPr lang="en-US" dirty="0">
                 <a:solidFill>
                   <a:schemeClr val="bg1"/>
                 </a:solidFill>
@@ -2509,7 +2495,15 @@
           </a:p>
           <a:p>
             <a:pPr algn="ctr"/>
-            <a:endParaRPr lang="en-US" dirty="0" smtClean="0">
+            <a:endParaRPr lang="en-US" dirty="0">
+              <a:solidFill>
+                <a:schemeClr val="bg1"/>
+              </a:solidFill>
+            </a:endParaRPr>
+          </a:p>
+          <a:p>
+            <a:pPr algn="ctr"/>
+            <a:endParaRPr lang="en-US" dirty="0">
               <a:solidFill>
                 <a:schemeClr val="bg1"/>
               </a:solidFill>
@@ -2573,10 +2567,9 @@
           <a:lstStyle/>
           <a:p>
             <a:r>
-              <a:rPr lang="en-US" dirty="0" smtClean="0"/>
+              <a:rPr lang="en-US" dirty="0"/>
               <a:t>Standard register</a:t>
             </a:r>
-            <a:endParaRPr lang="en-US" dirty="0"/>
           </a:p>
         </p:txBody>
       </p:sp>
@@ -2638,10 +2631,9 @@
           <a:lstStyle/>
           <a:p>
             <a:r>
-              <a:rPr lang="en-US" dirty="0" smtClean="0"/>
+              <a:rPr lang="en-US" dirty="0"/>
               <a:t>gain register</a:t>
             </a:r>
-            <a:endParaRPr lang="en-US" dirty="0"/>
           </a:p>
         </p:txBody>
       </p:sp>
@@ -2701,10 +2693,9 @@
           <a:lstStyle/>
           <a:p>
             <a:r>
-              <a:rPr lang="en-US" dirty="0" smtClean="0"/>
+              <a:rPr lang="en-US" dirty="0"/>
               <a:t>corner register</a:t>
             </a:r>
-            <a:endParaRPr lang="en-US" dirty="0"/>
           </a:p>
         </p:txBody>
       </p:sp>

</xml_diff>